<commit_message>
[#66] Update GUI UX document, ignore mdcache
</commit_message>
<xml_diff>
--- a/UIUX/[feature]_png_to_spr.pptx
+++ b/UIUX/[feature]_png_to_spr.pptx
@@ -123,7 +123,7 @@
             <p14:sldId id="258"/>
           </p14:sldIdLst>
         </p14:section>
-        <p14:section name="edit global size" id="{DF241E84-06FD-4E32-BDF9-81719BC9011F}">
+        <p14:section name="Edit global size" id="{DF241E84-06FD-4E32-BDF9-81719BC9011F}">
           <p14:sldIdLst>
             <p14:sldId id="261"/>
             <p14:sldId id="262"/>
@@ -292,7 +292,7 @@
           <a:p>
             <a:fld id="{F8D16698-19B9-4DD0-AC84-4B4460A3B13B}" type="datetimeFigureOut">
               <a:rPr lang="en-US" smtClean="0"/>
-              <a:t>10/1/2023</a:t>
+              <a:t>10/3/2023</a:t>
             </a:fld>
             <a:endParaRPr lang="en-US"/>
           </a:p>
@@ -490,7 +490,7 @@
           <a:p>
             <a:fld id="{F8D16698-19B9-4DD0-AC84-4B4460A3B13B}" type="datetimeFigureOut">
               <a:rPr lang="en-US" smtClean="0"/>
-              <a:t>10/1/2023</a:t>
+              <a:t>10/3/2023</a:t>
             </a:fld>
             <a:endParaRPr lang="en-US"/>
           </a:p>
@@ -765,7 +765,7 @@
           <a:p>
             <a:fld id="{F8D16698-19B9-4DD0-AC84-4B4460A3B13B}" type="datetimeFigureOut">
               <a:rPr lang="en-US" smtClean="0"/>
-              <a:t>10/1/2023</a:t>
+              <a:t>10/3/2023</a:t>
             </a:fld>
             <a:endParaRPr lang="en-US"/>
           </a:p>
@@ -1030,7 +1030,7 @@
           <a:p>
             <a:fld id="{F8D16698-19B9-4DD0-AC84-4B4460A3B13B}" type="datetimeFigureOut">
               <a:rPr lang="en-US" smtClean="0"/>
-              <a:t>10/1/2023</a:t>
+              <a:t>10/3/2023</a:t>
             </a:fld>
             <a:endParaRPr lang="en-US"/>
           </a:p>
@@ -1350,7 +1350,7 @@
           <a:p>
             <a:fld id="{F8D16698-19B9-4DD0-AC84-4B4460A3B13B}" type="datetimeFigureOut">
               <a:rPr lang="en-US" smtClean="0"/>
-              <a:t>10/1/2023</a:t>
+              <a:t>10/3/2023</a:t>
             </a:fld>
             <a:endParaRPr lang="en-US"/>
           </a:p>

</xml_diff>

<commit_message>
[#66] Add UX for frame editor
</commit_message>
<xml_diff>
--- a/UIUX/[feature]_png_to_spr.pptx
+++ b/UIUX/[feature]_png_to_spr.pptx
@@ -12,6 +12,7 @@
     <p:sldId id="263" r:id="rId6"/>
     <p:sldId id="264" r:id="rId7"/>
     <p:sldId id="265" r:id="rId8"/>
+    <p:sldId id="267" r:id="rId9"/>
   </p:sldIdLst>
   <p:sldSz cx="12192000" cy="6858000"/>
   <p:notesSz cx="6858000" cy="9144000"/>
@@ -136,6 +137,11 @@
             <p14:sldId id="265"/>
           </p14:sldIdLst>
         </p14:section>
+        <p14:section name="Frame editor" id="{94F989C0-9FF8-4B68-850E-2EAD26AB9347}">
+          <p14:sldIdLst>
+            <p14:sldId id="267"/>
+          </p14:sldIdLst>
+        </p14:section>
       </p14:sectionLst>
     </p:ext>
     <p:ext uri="{EFAFB233-063F-42B5-8137-9DF3F51BA10A}">
@@ -292,7 +298,7 @@
           <a:p>
             <a:fld id="{F8D16698-19B9-4DD0-AC84-4B4460A3B13B}" type="datetimeFigureOut">
               <a:rPr lang="en-US" smtClean="0"/>
-              <a:t>10/3/2023</a:t>
+              <a:t>10/14/2023</a:t>
             </a:fld>
             <a:endParaRPr lang="en-US"/>
           </a:p>
@@ -490,7 +496,7 @@
           <a:p>
             <a:fld id="{F8D16698-19B9-4DD0-AC84-4B4460A3B13B}" type="datetimeFigureOut">
               <a:rPr lang="en-US" smtClean="0"/>
-              <a:t>10/3/2023</a:t>
+              <a:t>10/14/2023</a:t>
             </a:fld>
             <a:endParaRPr lang="en-US"/>
           </a:p>
@@ -765,7 +771,7 @@
           <a:p>
             <a:fld id="{F8D16698-19B9-4DD0-AC84-4B4460A3B13B}" type="datetimeFigureOut">
               <a:rPr lang="en-US" smtClean="0"/>
-              <a:t>10/3/2023</a:t>
+              <a:t>10/14/2023</a:t>
             </a:fld>
             <a:endParaRPr lang="en-US"/>
           </a:p>
@@ -1030,7 +1036,7 @@
           <a:p>
             <a:fld id="{F8D16698-19B9-4DD0-AC84-4B4460A3B13B}" type="datetimeFigureOut">
               <a:rPr lang="en-US" smtClean="0"/>
-              <a:t>10/3/2023</a:t>
+              <a:t>10/14/2023</a:t>
             </a:fld>
             <a:endParaRPr lang="en-US"/>
           </a:p>
@@ -1350,7 +1356,7 @@
           <a:p>
             <a:fld id="{F8D16698-19B9-4DD0-AC84-4B4460A3B13B}" type="datetimeFigureOut">
               <a:rPr lang="en-US" smtClean="0"/>
-              <a:t>10/3/2023</a:t>
+              <a:t>10/14/2023</a:t>
             </a:fld>
             <a:endParaRPr lang="en-US"/>
           </a:p>
@@ -9542,6 +9548,1171 @@
     <p:extLst>
       <p:ext uri="{BB962C8B-B14F-4D97-AF65-F5344CB8AC3E}">
         <p14:creationId xmlns:p14="http://schemas.microsoft.com/office/powerpoint/2010/main" val="113487918"/>
+      </p:ext>
+    </p:extLst>
+  </p:cSld>
+  <p:clrMapOvr>
+    <a:masterClrMapping/>
+  </p:clrMapOvr>
+</p:sld>
+</file>
+
+<file path=ppt/slides/slide8.xml><?xml version="1.0" encoding="utf-8"?>
+<p:sld xmlns:a="http://schemas.openxmlformats.org/drawingml/2006/main" xmlns:r="http://schemas.openxmlformats.org/officeDocument/2006/relationships" xmlns:p="http://schemas.openxmlformats.org/presentationml/2006/main">
+  <p:cSld>
+    <p:spTree>
+      <p:nvGrpSpPr>
+        <p:cNvPr id="1" name=""/>
+        <p:cNvGrpSpPr/>
+        <p:nvPr/>
+      </p:nvGrpSpPr>
+      <p:grpSpPr>
+        <a:xfrm>
+          <a:off x="0" y="0"/>
+          <a:ext cx="0" cy="0"/>
+          <a:chOff x="0" y="0"/>
+          <a:chExt cx="0" cy="0"/>
+        </a:xfrm>
+      </p:grpSpPr>
+      <p:pic>
+        <p:nvPicPr>
+          <p:cNvPr id="4" name="Picture 3">
+            <a:extLst>
+              <a:ext uri="{FF2B5EF4-FFF2-40B4-BE49-F238E27FC236}">
+                <a16:creationId xmlns:a16="http://schemas.microsoft.com/office/drawing/2014/main" id="{CBDBA5CF-04CF-4507-8F9C-8D113E051701}"/>
+              </a:ext>
+            </a:extLst>
+          </p:cNvPr>
+          <p:cNvPicPr>
+            <a:picLocks noGrp="1" noSelect="1" noRot="1" noChangeAspect="1" noMove="1" noResize="1" noEditPoints="1" noAdjustHandles="1" noChangeArrowheads="1" noChangeShapeType="1" noCrop="1"/>
+          </p:cNvPicPr>
+          <p:nvPr/>
+        </p:nvPicPr>
+        <p:blipFill>
+          <a:blip r:embed="rId2"/>
+          <a:stretch>
+            <a:fillRect/>
+          </a:stretch>
+        </p:blipFill>
+        <p:spPr>
+          <a:xfrm>
+            <a:off x="114300" y="142875"/>
+            <a:ext cx="5734050" cy="4133850"/>
+          </a:xfrm>
+          <a:prstGeom prst="rect">
+            <a:avLst/>
+          </a:prstGeom>
+        </p:spPr>
+      </p:pic>
+      <p:sp>
+        <p:nvSpPr>
+          <p:cNvPr id="2" name="TextBox 1">
+            <a:extLst>
+              <a:ext uri="{FF2B5EF4-FFF2-40B4-BE49-F238E27FC236}">
+                <a16:creationId xmlns:a16="http://schemas.microsoft.com/office/drawing/2014/main" id="{78AC5B42-12EB-41C8-A740-3F0874E943DE}"/>
+              </a:ext>
+            </a:extLst>
+          </p:cNvPr>
+          <p:cNvSpPr txBox="1"/>
+          <p:nvPr/>
+        </p:nvSpPr>
+        <p:spPr>
+          <a:xfrm>
+            <a:off x="1262062" y="2834758"/>
+            <a:ext cx="1423788" cy="338554"/>
+          </a:xfrm>
+          <a:prstGeom prst="rect">
+            <a:avLst/>
+          </a:prstGeom>
+          <a:noFill/>
+        </p:spPr>
+        <p:txBody>
+          <a:bodyPr wrap="none" rtlCol="0">
+            <a:spAutoFit/>
+          </a:bodyPr>
+          <a:lstStyle/>
+          <a:p>
+            <a:r>
+              <a:rPr lang="en-US" sz="1600" b="1"/>
+              <a:t>SPR edit mode</a:t>
+            </a:r>
+          </a:p>
+        </p:txBody>
+      </p:sp>
+      <p:sp>
+        <p:nvSpPr>
+          <p:cNvPr id="6" name="TextBox 5">
+            <a:extLst>
+              <a:ext uri="{FF2B5EF4-FFF2-40B4-BE49-F238E27FC236}">
+                <a16:creationId xmlns:a16="http://schemas.microsoft.com/office/drawing/2014/main" id="{BA56F98D-08F1-4587-9544-B705A2EA8875}"/>
+              </a:ext>
+            </a:extLst>
+          </p:cNvPr>
+          <p:cNvSpPr txBox="1"/>
+          <p:nvPr/>
+        </p:nvSpPr>
+        <p:spPr>
+          <a:xfrm>
+            <a:off x="1262062" y="3087171"/>
+            <a:ext cx="1186094" cy="307777"/>
+          </a:xfrm>
+          <a:prstGeom prst="rect">
+            <a:avLst/>
+          </a:prstGeom>
+          <a:noFill/>
+        </p:spPr>
+        <p:txBody>
+          <a:bodyPr wrap="none" rtlCol="0">
+            <a:spAutoFit/>
+          </a:bodyPr>
+          <a:lstStyle/>
+          <a:p>
+            <a:r>
+              <a:rPr lang="en-US" sz="1400" b="1"/>
+              <a:t>File head info</a:t>
+            </a:r>
+          </a:p>
+        </p:txBody>
+      </p:sp>
+      <p:sp>
+        <p:nvSpPr>
+          <p:cNvPr id="7" name="TextBox 6">
+            <a:extLst>
+              <a:ext uri="{FF2B5EF4-FFF2-40B4-BE49-F238E27FC236}">
+                <a16:creationId xmlns:a16="http://schemas.microsoft.com/office/drawing/2014/main" id="{91767275-EC5B-440C-A5A2-C21314285E2B}"/>
+              </a:ext>
+            </a:extLst>
+          </p:cNvPr>
+          <p:cNvSpPr txBox="1"/>
+          <p:nvPr/>
+        </p:nvSpPr>
+        <p:spPr>
+          <a:xfrm>
+            <a:off x="1262062" y="3334137"/>
+            <a:ext cx="2954655" cy="2516073"/>
+          </a:xfrm>
+          <a:prstGeom prst="rect">
+            <a:avLst/>
+          </a:prstGeom>
+          <a:noFill/>
+        </p:spPr>
+        <p:txBody>
+          <a:bodyPr wrap="none" rtlCol="0">
+            <a:spAutoFit/>
+          </a:bodyPr>
+          <a:lstStyle/>
+          <a:p>
+            <a:r>
+              <a:rPr lang="en-US" sz="1050" b="1"/>
+              <a:t>Global width:        640</a:t>
+            </a:r>
+          </a:p>
+          <a:p>
+            <a:r>
+              <a:rPr lang="en-US" sz="1050" b="1"/>
+              <a:t>Global height:        360</a:t>
+            </a:r>
+          </a:p>
+          <a:p>
+            <a:r>
+              <a:rPr lang="en-US" sz="1050" b="1"/>
+              <a:t>Global offset X:         0</a:t>
+            </a:r>
+          </a:p>
+          <a:p>
+            <a:r>
+              <a:rPr lang="en-US" sz="1050" b="1"/>
+              <a:t>Global offset Y:         0</a:t>
+            </a:r>
+          </a:p>
+          <a:p>
+            <a:r>
+              <a:rPr lang="en-US" sz="1050" b="1"/>
+              <a:t>Colors count: 256</a:t>
+            </a:r>
+          </a:p>
+          <a:p>
+            <a:r>
+              <a:rPr lang="en-US" sz="1050" b="1"/>
+              <a:t>Directions count: 1</a:t>
+            </a:r>
+          </a:p>
+          <a:p>
+            <a:r>
+              <a:rPr lang="en-US" sz="1050" b="1"/>
+              <a:t>Frames count: 1		Frame:            0	</a:t>
+            </a:r>
+          </a:p>
+          <a:p>
+            <a:endParaRPr lang="en-US" sz="1050" b="1"/>
+          </a:p>
+          <a:p>
+            <a:endParaRPr lang="en-US" sz="1050" b="1"/>
+          </a:p>
+          <a:p>
+            <a:endParaRPr lang="en-US" sz="1050" b="1"/>
+          </a:p>
+          <a:p>
+            <a:r>
+              <a:rPr lang="en-US" sz="1050" b="1"/>
+              <a:t>Frame width:        640</a:t>
+            </a:r>
+          </a:p>
+          <a:p>
+            <a:r>
+              <a:rPr lang="en-US" sz="1050" b="1"/>
+              <a:t>Frame height:        360</a:t>
+            </a:r>
+          </a:p>
+          <a:p>
+            <a:r>
+              <a:rPr lang="en-US" sz="1050" b="1"/>
+              <a:t>Frame offset X:        0</a:t>
+            </a:r>
+          </a:p>
+          <a:p>
+            <a:r>
+              <a:rPr lang="en-US" sz="1050" b="1"/>
+              <a:t>Frame offset Y:        0 </a:t>
+            </a:r>
+          </a:p>
+          <a:p>
+            <a:r>
+              <a:rPr lang="en-US" sz="1050" b="1"/>
+              <a:t>Interval:        1 	                      (27in=36fps)</a:t>
+            </a:r>
+          </a:p>
+        </p:txBody>
+      </p:sp>
+      <p:pic>
+        <p:nvPicPr>
+          <p:cNvPr id="10" name="Picture 9">
+            <a:extLst>
+              <a:ext uri="{FF2B5EF4-FFF2-40B4-BE49-F238E27FC236}">
+                <a16:creationId xmlns:a16="http://schemas.microsoft.com/office/drawing/2014/main" id="{2FA78A65-17B6-4DF4-A33E-79221F178514}"/>
+              </a:ext>
+            </a:extLst>
+          </p:cNvPr>
+          <p:cNvPicPr>
+            <a:picLocks noChangeAspect="1"/>
+          </p:cNvPicPr>
+          <p:nvPr/>
+        </p:nvPicPr>
+        <p:blipFill>
+          <a:blip r:embed="rId3"/>
+          <a:stretch>
+            <a:fillRect/>
+          </a:stretch>
+        </p:blipFill>
+        <p:spPr>
+          <a:xfrm>
+            <a:off x="2981325" y="4354206"/>
+            <a:ext cx="143900" cy="147638"/>
+          </a:xfrm>
+          <a:prstGeom prst="rect">
+            <a:avLst/>
+          </a:prstGeom>
+        </p:spPr>
+      </p:pic>
+      <p:pic>
+        <p:nvPicPr>
+          <p:cNvPr id="11" name="Picture 10">
+            <a:extLst>
+              <a:ext uri="{FF2B5EF4-FFF2-40B4-BE49-F238E27FC236}">
+                <a16:creationId xmlns:a16="http://schemas.microsoft.com/office/drawing/2014/main" id="{51163AD7-3C76-4BD9-887C-8B5957476943}"/>
+              </a:ext>
+            </a:extLst>
+          </p:cNvPr>
+          <p:cNvPicPr>
+            <a:picLocks noChangeAspect="1"/>
+          </p:cNvPicPr>
+          <p:nvPr/>
+        </p:nvPicPr>
+        <p:blipFill>
+          <a:blip r:embed="rId4"/>
+          <a:stretch>
+            <a:fillRect/>
+          </a:stretch>
+        </p:blipFill>
+        <p:spPr>
+          <a:xfrm>
+            <a:off x="4113664" y="4340225"/>
+            <a:ext cx="161893" cy="147638"/>
+          </a:xfrm>
+          <a:prstGeom prst="rect">
+            <a:avLst/>
+          </a:prstGeom>
+        </p:spPr>
+      </p:pic>
+      <p:pic>
+        <p:nvPicPr>
+          <p:cNvPr id="12" name="Picture 11">
+            <a:extLst>
+              <a:ext uri="{FF2B5EF4-FFF2-40B4-BE49-F238E27FC236}">
+                <a16:creationId xmlns:a16="http://schemas.microsoft.com/office/drawing/2014/main" id="{4C541B28-96E2-4056-A331-F213F6B365D9}"/>
+              </a:ext>
+            </a:extLst>
+          </p:cNvPr>
+          <p:cNvPicPr>
+            <a:picLocks noChangeAspect="1"/>
+          </p:cNvPicPr>
+          <p:nvPr/>
+        </p:nvPicPr>
+        <p:blipFill>
+          <a:blip r:embed="rId5"/>
+          <a:stretch>
+            <a:fillRect/>
+          </a:stretch>
+        </p:blipFill>
+        <p:spPr>
+          <a:xfrm>
+            <a:off x="3661591" y="4344265"/>
+            <a:ext cx="149674" cy="147638"/>
+          </a:xfrm>
+          <a:prstGeom prst="rect">
+            <a:avLst/>
+          </a:prstGeom>
+        </p:spPr>
+      </p:pic>
+      <p:pic>
+        <p:nvPicPr>
+          <p:cNvPr id="15" name="Picture 14">
+            <a:extLst>
+              <a:ext uri="{FF2B5EF4-FFF2-40B4-BE49-F238E27FC236}">
+                <a16:creationId xmlns:a16="http://schemas.microsoft.com/office/drawing/2014/main" id="{A25B3327-0021-4332-A47E-CFFA8C3A5D44}"/>
+              </a:ext>
+            </a:extLst>
+          </p:cNvPr>
+          <p:cNvPicPr>
+            <a:picLocks noChangeAspect="1"/>
+          </p:cNvPicPr>
+          <p:nvPr/>
+        </p:nvPicPr>
+        <p:blipFill>
+          <a:blip r:embed="rId4"/>
+          <a:stretch>
+            <a:fillRect/>
+          </a:stretch>
+        </p:blipFill>
+        <p:spPr>
+          <a:xfrm>
+            <a:off x="2604903" y="3385702"/>
+            <a:ext cx="161893" cy="147638"/>
+          </a:xfrm>
+          <a:prstGeom prst="rect">
+            <a:avLst/>
+          </a:prstGeom>
+        </p:spPr>
+      </p:pic>
+      <p:pic>
+        <p:nvPicPr>
+          <p:cNvPr id="16" name="Picture 15">
+            <a:extLst>
+              <a:ext uri="{FF2B5EF4-FFF2-40B4-BE49-F238E27FC236}">
+                <a16:creationId xmlns:a16="http://schemas.microsoft.com/office/drawing/2014/main" id="{7F72DE22-44AC-4620-9C46-DD40BACD9E03}"/>
+              </a:ext>
+            </a:extLst>
+          </p:cNvPr>
+          <p:cNvPicPr>
+            <a:picLocks noChangeAspect="1"/>
+          </p:cNvPicPr>
+          <p:nvPr/>
+        </p:nvPicPr>
+        <p:blipFill>
+          <a:blip r:embed="rId5"/>
+          <a:stretch>
+            <a:fillRect/>
+          </a:stretch>
+        </p:blipFill>
+        <p:spPr>
+          <a:xfrm>
+            <a:off x="2152830" y="3389742"/>
+            <a:ext cx="149674" cy="147638"/>
+          </a:xfrm>
+          <a:prstGeom prst="rect">
+            <a:avLst/>
+          </a:prstGeom>
+        </p:spPr>
+      </p:pic>
+      <p:pic>
+        <p:nvPicPr>
+          <p:cNvPr id="17" name="Picture 16">
+            <a:extLst>
+              <a:ext uri="{FF2B5EF4-FFF2-40B4-BE49-F238E27FC236}">
+                <a16:creationId xmlns:a16="http://schemas.microsoft.com/office/drawing/2014/main" id="{B9EEC9DA-4CB8-4A7D-A3F0-87F82C9CB3FC}"/>
+              </a:ext>
+            </a:extLst>
+          </p:cNvPr>
+          <p:cNvPicPr>
+            <a:picLocks noChangeAspect="1"/>
+          </p:cNvPicPr>
+          <p:nvPr/>
+        </p:nvPicPr>
+        <p:blipFill>
+          <a:blip r:embed="rId4"/>
+          <a:stretch>
+            <a:fillRect/>
+          </a:stretch>
+        </p:blipFill>
+        <p:spPr>
+          <a:xfrm>
+            <a:off x="2619192" y="3548360"/>
+            <a:ext cx="161893" cy="147638"/>
+          </a:xfrm>
+          <a:prstGeom prst="rect">
+            <a:avLst/>
+          </a:prstGeom>
+        </p:spPr>
+      </p:pic>
+      <p:pic>
+        <p:nvPicPr>
+          <p:cNvPr id="18" name="Picture 17">
+            <a:extLst>
+              <a:ext uri="{FF2B5EF4-FFF2-40B4-BE49-F238E27FC236}">
+                <a16:creationId xmlns:a16="http://schemas.microsoft.com/office/drawing/2014/main" id="{70F35F2A-5E32-4B3F-93A5-2F3AD3323F8C}"/>
+              </a:ext>
+            </a:extLst>
+          </p:cNvPr>
+          <p:cNvPicPr>
+            <a:picLocks noChangeAspect="1"/>
+          </p:cNvPicPr>
+          <p:nvPr/>
+        </p:nvPicPr>
+        <p:blipFill>
+          <a:blip r:embed="rId5"/>
+          <a:stretch>
+            <a:fillRect/>
+          </a:stretch>
+        </p:blipFill>
+        <p:spPr>
+          <a:xfrm>
+            <a:off x="2167119" y="3552400"/>
+            <a:ext cx="149674" cy="147638"/>
+          </a:xfrm>
+          <a:prstGeom prst="rect">
+            <a:avLst/>
+          </a:prstGeom>
+        </p:spPr>
+      </p:pic>
+      <p:grpSp>
+        <p:nvGrpSpPr>
+          <p:cNvPr id="14" name="Group 13">
+            <a:extLst>
+              <a:ext uri="{FF2B5EF4-FFF2-40B4-BE49-F238E27FC236}">
+                <a16:creationId xmlns:a16="http://schemas.microsoft.com/office/drawing/2014/main" id="{C16F8053-B979-404C-90D0-A73B5FB935A6}"/>
+              </a:ext>
+            </a:extLst>
+          </p:cNvPr>
+          <p:cNvGrpSpPr/>
+          <p:nvPr/>
+        </p:nvGrpSpPr>
+        <p:grpSpPr>
+          <a:xfrm>
+            <a:off x="1852678" y="4993740"/>
+            <a:ext cx="934461" cy="790102"/>
+            <a:chOff x="1852678" y="4993740"/>
+            <a:chExt cx="934461" cy="790102"/>
+          </a:xfrm>
+        </p:grpSpPr>
+        <p:pic>
+          <p:nvPicPr>
+            <p:cNvPr id="19" name="Picture 18">
+              <a:extLst>
+                <a:ext uri="{FF2B5EF4-FFF2-40B4-BE49-F238E27FC236}">
+                  <a16:creationId xmlns:a16="http://schemas.microsoft.com/office/drawing/2014/main" id="{1A8FC2DF-1492-405A-BCAB-82B4F14E665B}"/>
+                </a:ext>
+              </a:extLst>
+            </p:cNvPr>
+            <p:cNvPicPr>
+              <a:picLocks noChangeAspect="1"/>
+            </p:cNvPicPr>
+            <p:nvPr/>
+          </p:nvPicPr>
+          <p:blipFill>
+            <a:blip r:embed="rId4"/>
+            <a:stretch>
+              <a:fillRect/>
+            </a:stretch>
+          </p:blipFill>
+          <p:spPr>
+            <a:xfrm>
+              <a:off x="2625246" y="4993740"/>
+              <a:ext cx="161893" cy="147638"/>
+            </a:xfrm>
+            <a:prstGeom prst="rect">
+              <a:avLst/>
+            </a:prstGeom>
+          </p:spPr>
+        </p:pic>
+        <p:pic>
+          <p:nvPicPr>
+            <p:cNvPr id="20" name="Picture 19">
+              <a:extLst>
+                <a:ext uri="{FF2B5EF4-FFF2-40B4-BE49-F238E27FC236}">
+                  <a16:creationId xmlns:a16="http://schemas.microsoft.com/office/drawing/2014/main" id="{9095908D-CB35-4C64-B1BD-8C57529AFAAD}"/>
+                </a:ext>
+              </a:extLst>
+            </p:cNvPr>
+            <p:cNvPicPr>
+              <a:picLocks noChangeAspect="1"/>
+            </p:cNvPicPr>
+            <p:nvPr/>
+          </p:nvPicPr>
+          <p:blipFill>
+            <a:blip r:embed="rId5"/>
+            <a:stretch>
+              <a:fillRect/>
+            </a:stretch>
+          </p:blipFill>
+          <p:spPr>
+            <a:xfrm>
+              <a:off x="2133780" y="4997780"/>
+              <a:ext cx="149674" cy="147638"/>
+            </a:xfrm>
+            <a:prstGeom prst="rect">
+              <a:avLst/>
+            </a:prstGeom>
+          </p:spPr>
+        </p:pic>
+        <p:pic>
+          <p:nvPicPr>
+            <p:cNvPr id="21" name="Picture 20">
+              <a:extLst>
+                <a:ext uri="{FF2B5EF4-FFF2-40B4-BE49-F238E27FC236}">
+                  <a16:creationId xmlns:a16="http://schemas.microsoft.com/office/drawing/2014/main" id="{52081149-A749-4A3C-B750-DEB51DBC0A09}"/>
+                </a:ext>
+              </a:extLst>
+            </p:cNvPr>
+            <p:cNvPicPr>
+              <a:picLocks noChangeAspect="1"/>
+            </p:cNvPicPr>
+            <p:nvPr/>
+          </p:nvPicPr>
+          <p:blipFill>
+            <a:blip r:embed="rId4"/>
+            <a:stretch>
+              <a:fillRect/>
+            </a:stretch>
+          </p:blipFill>
+          <p:spPr>
+            <a:xfrm>
+              <a:off x="2615790" y="5148973"/>
+              <a:ext cx="161893" cy="147638"/>
+            </a:xfrm>
+            <a:prstGeom prst="rect">
+              <a:avLst/>
+            </a:prstGeom>
+          </p:spPr>
+        </p:pic>
+        <p:pic>
+          <p:nvPicPr>
+            <p:cNvPr id="22" name="Picture 21">
+              <a:extLst>
+                <a:ext uri="{FF2B5EF4-FFF2-40B4-BE49-F238E27FC236}">
+                  <a16:creationId xmlns:a16="http://schemas.microsoft.com/office/drawing/2014/main" id="{C30298B4-8F37-4C6D-8A1B-09C4BFE30EA2}"/>
+                </a:ext>
+              </a:extLst>
+            </p:cNvPr>
+            <p:cNvPicPr>
+              <a:picLocks noChangeAspect="1"/>
+            </p:cNvPicPr>
+            <p:nvPr/>
+          </p:nvPicPr>
+          <p:blipFill>
+            <a:blip r:embed="rId5"/>
+            <a:stretch>
+              <a:fillRect/>
+            </a:stretch>
+          </p:blipFill>
+          <p:spPr>
+            <a:xfrm>
+              <a:off x="2163717" y="5153013"/>
+              <a:ext cx="149674" cy="147638"/>
+            </a:xfrm>
+            <a:prstGeom prst="rect">
+              <a:avLst/>
+            </a:prstGeom>
+          </p:spPr>
+        </p:pic>
+        <p:pic>
+          <p:nvPicPr>
+            <p:cNvPr id="23" name="Picture 22">
+              <a:extLst>
+                <a:ext uri="{FF2B5EF4-FFF2-40B4-BE49-F238E27FC236}">
+                  <a16:creationId xmlns:a16="http://schemas.microsoft.com/office/drawing/2014/main" id="{237B4EF9-A03C-40E2-9771-2F96AA34A333}"/>
+                </a:ext>
+              </a:extLst>
+            </p:cNvPr>
+            <p:cNvPicPr>
+              <a:picLocks noChangeAspect="1"/>
+            </p:cNvPicPr>
+            <p:nvPr/>
+          </p:nvPicPr>
+          <p:blipFill>
+            <a:blip r:embed="rId4"/>
+            <a:stretch>
+              <a:fillRect/>
+            </a:stretch>
+          </p:blipFill>
+          <p:spPr>
+            <a:xfrm>
+              <a:off x="2577496" y="5308516"/>
+              <a:ext cx="161893" cy="147638"/>
+            </a:xfrm>
+            <a:prstGeom prst="rect">
+              <a:avLst/>
+            </a:prstGeom>
+          </p:spPr>
+        </p:pic>
+        <p:pic>
+          <p:nvPicPr>
+            <p:cNvPr id="24" name="Picture 23">
+              <a:extLst>
+                <a:ext uri="{FF2B5EF4-FFF2-40B4-BE49-F238E27FC236}">
+                  <a16:creationId xmlns:a16="http://schemas.microsoft.com/office/drawing/2014/main" id="{961DE9B0-6F68-4648-8974-EB57B3A6A624}"/>
+                </a:ext>
+              </a:extLst>
+            </p:cNvPr>
+            <p:cNvPicPr>
+              <a:picLocks noChangeAspect="1"/>
+            </p:cNvPicPr>
+            <p:nvPr/>
+          </p:nvPicPr>
+          <p:blipFill>
+            <a:blip r:embed="rId5"/>
+            <a:stretch>
+              <a:fillRect/>
+            </a:stretch>
+          </p:blipFill>
+          <p:spPr>
+            <a:xfrm>
+              <a:off x="2227667" y="5312556"/>
+              <a:ext cx="149674" cy="147638"/>
+            </a:xfrm>
+            <a:prstGeom prst="rect">
+              <a:avLst/>
+            </a:prstGeom>
+          </p:spPr>
+        </p:pic>
+        <p:pic>
+          <p:nvPicPr>
+            <p:cNvPr id="25" name="Picture 24">
+              <a:extLst>
+                <a:ext uri="{FF2B5EF4-FFF2-40B4-BE49-F238E27FC236}">
+                  <a16:creationId xmlns:a16="http://schemas.microsoft.com/office/drawing/2014/main" id="{8AC1F569-18AF-4161-9243-4BC4EF44A06C}"/>
+                </a:ext>
+              </a:extLst>
+            </p:cNvPr>
+            <p:cNvPicPr>
+              <a:picLocks noChangeAspect="1"/>
+            </p:cNvPicPr>
+            <p:nvPr/>
+          </p:nvPicPr>
+          <p:blipFill>
+            <a:blip r:embed="rId4"/>
+            <a:stretch>
+              <a:fillRect/>
+            </a:stretch>
+          </p:blipFill>
+          <p:spPr>
+            <a:xfrm>
+              <a:off x="2577496" y="5463749"/>
+              <a:ext cx="161893" cy="147638"/>
+            </a:xfrm>
+            <a:prstGeom prst="rect">
+              <a:avLst/>
+            </a:prstGeom>
+          </p:spPr>
+        </p:pic>
+        <p:pic>
+          <p:nvPicPr>
+            <p:cNvPr id="26" name="Picture 25">
+              <a:extLst>
+                <a:ext uri="{FF2B5EF4-FFF2-40B4-BE49-F238E27FC236}">
+                  <a16:creationId xmlns:a16="http://schemas.microsoft.com/office/drawing/2014/main" id="{774ED6B5-1EC3-424C-B3A0-2CE944762D77}"/>
+                </a:ext>
+              </a:extLst>
+            </p:cNvPr>
+            <p:cNvPicPr>
+              <a:picLocks noChangeAspect="1"/>
+            </p:cNvPicPr>
+            <p:nvPr/>
+          </p:nvPicPr>
+          <p:blipFill>
+            <a:blip r:embed="rId5"/>
+            <a:stretch>
+              <a:fillRect/>
+            </a:stretch>
+          </p:blipFill>
+          <p:spPr>
+            <a:xfrm>
+              <a:off x="2227667" y="5467789"/>
+              <a:ext cx="149674" cy="147638"/>
+            </a:xfrm>
+            <a:prstGeom prst="rect">
+              <a:avLst/>
+            </a:prstGeom>
+          </p:spPr>
+        </p:pic>
+        <p:pic>
+          <p:nvPicPr>
+            <p:cNvPr id="27" name="Picture 26">
+              <a:extLst>
+                <a:ext uri="{FF2B5EF4-FFF2-40B4-BE49-F238E27FC236}">
+                  <a16:creationId xmlns:a16="http://schemas.microsoft.com/office/drawing/2014/main" id="{970F794C-0ABA-456E-9E6B-39622FC9DDEA}"/>
+                </a:ext>
+              </a:extLst>
+            </p:cNvPr>
+            <p:cNvPicPr>
+              <a:picLocks noChangeAspect="1"/>
+            </p:cNvPicPr>
+            <p:nvPr/>
+          </p:nvPicPr>
+          <p:blipFill>
+            <a:blip r:embed="rId4"/>
+            <a:stretch>
+              <a:fillRect/>
+            </a:stretch>
+          </p:blipFill>
+          <p:spPr>
+            <a:xfrm>
+              <a:off x="2202507" y="5632164"/>
+              <a:ext cx="161893" cy="147638"/>
+            </a:xfrm>
+            <a:prstGeom prst="rect">
+              <a:avLst/>
+            </a:prstGeom>
+          </p:spPr>
+        </p:pic>
+        <p:pic>
+          <p:nvPicPr>
+            <p:cNvPr id="28" name="Picture 27">
+              <a:extLst>
+                <a:ext uri="{FF2B5EF4-FFF2-40B4-BE49-F238E27FC236}">
+                  <a16:creationId xmlns:a16="http://schemas.microsoft.com/office/drawing/2014/main" id="{F95A1C7F-8CCC-4EDD-92FA-E5E84CD0E027}"/>
+                </a:ext>
+              </a:extLst>
+            </p:cNvPr>
+            <p:cNvPicPr>
+              <a:picLocks noChangeAspect="1"/>
+            </p:cNvPicPr>
+            <p:nvPr/>
+          </p:nvPicPr>
+          <p:blipFill>
+            <a:blip r:embed="rId5"/>
+            <a:stretch>
+              <a:fillRect/>
+            </a:stretch>
+          </p:blipFill>
+          <p:spPr>
+            <a:xfrm>
+              <a:off x="1852678" y="5636204"/>
+              <a:ext cx="149674" cy="147638"/>
+            </a:xfrm>
+            <a:prstGeom prst="rect">
+              <a:avLst/>
+            </a:prstGeom>
+          </p:spPr>
+        </p:pic>
+      </p:grpSp>
+      <p:sp>
+        <p:nvSpPr>
+          <p:cNvPr id="29" name="TextBox 28">
+            <a:extLst>
+              <a:ext uri="{FF2B5EF4-FFF2-40B4-BE49-F238E27FC236}">
+                <a16:creationId xmlns:a16="http://schemas.microsoft.com/office/drawing/2014/main" id="{4A391B46-B4C1-4F42-BCAD-F590C5A1B901}"/>
+              </a:ext>
+            </a:extLst>
+          </p:cNvPr>
+          <p:cNvSpPr txBox="1"/>
+          <p:nvPr/>
+        </p:nvSpPr>
+        <p:spPr>
+          <a:xfrm>
+            <a:off x="1262062" y="4666267"/>
+            <a:ext cx="980140" cy="307777"/>
+          </a:xfrm>
+          <a:prstGeom prst="rect">
+            <a:avLst/>
+          </a:prstGeom>
+          <a:noFill/>
+        </p:spPr>
+        <p:txBody>
+          <a:bodyPr wrap="none" rtlCol="0">
+            <a:spAutoFit/>
+          </a:bodyPr>
+          <a:lstStyle/>
+          <a:p>
+            <a:r>
+              <a:rPr lang="en-US" sz="1400" b="1"/>
+              <a:t>Frame info</a:t>
+            </a:r>
+          </a:p>
+        </p:txBody>
+      </p:sp>
+      <p:pic>
+        <p:nvPicPr>
+          <p:cNvPr id="30" name="Picture 29">
+            <a:extLst>
+              <a:ext uri="{FF2B5EF4-FFF2-40B4-BE49-F238E27FC236}">
+                <a16:creationId xmlns:a16="http://schemas.microsoft.com/office/drawing/2014/main" id="{9EED2309-3506-4888-9190-A4FA1C3E6DA3}"/>
+              </a:ext>
+            </a:extLst>
+          </p:cNvPr>
+          <p:cNvPicPr>
+            <a:picLocks noChangeAspect="1"/>
+          </p:cNvPicPr>
+          <p:nvPr/>
+        </p:nvPicPr>
+        <p:blipFill>
+          <a:blip r:embed="rId4"/>
+          <a:stretch>
+            <a:fillRect/>
+          </a:stretch>
+        </p:blipFill>
+        <p:spPr>
+          <a:xfrm>
+            <a:off x="2638373" y="3702043"/>
+            <a:ext cx="161893" cy="147638"/>
+          </a:xfrm>
+          <a:prstGeom prst="rect">
+            <a:avLst/>
+          </a:prstGeom>
+        </p:spPr>
+      </p:pic>
+      <p:pic>
+        <p:nvPicPr>
+          <p:cNvPr id="31" name="Picture 30">
+            <a:extLst>
+              <a:ext uri="{FF2B5EF4-FFF2-40B4-BE49-F238E27FC236}">
+                <a16:creationId xmlns:a16="http://schemas.microsoft.com/office/drawing/2014/main" id="{568AFC7B-0776-4B41-A08F-D023C2A781CB}"/>
+              </a:ext>
+            </a:extLst>
+          </p:cNvPr>
+          <p:cNvPicPr>
+            <a:picLocks noChangeAspect="1"/>
+          </p:cNvPicPr>
+          <p:nvPr/>
+        </p:nvPicPr>
+        <p:blipFill>
+          <a:blip r:embed="rId5"/>
+          <a:stretch>
+            <a:fillRect/>
+          </a:stretch>
+        </p:blipFill>
+        <p:spPr>
+          <a:xfrm>
+            <a:off x="2244272" y="3706083"/>
+            <a:ext cx="149674" cy="147638"/>
+          </a:xfrm>
+          <a:prstGeom prst="rect">
+            <a:avLst/>
+          </a:prstGeom>
+        </p:spPr>
+      </p:pic>
+      <p:pic>
+        <p:nvPicPr>
+          <p:cNvPr id="32" name="Picture 31">
+            <a:extLst>
+              <a:ext uri="{FF2B5EF4-FFF2-40B4-BE49-F238E27FC236}">
+                <a16:creationId xmlns:a16="http://schemas.microsoft.com/office/drawing/2014/main" id="{2CEDAF7C-3B01-418B-8D61-03BE3E86EE43}"/>
+              </a:ext>
+            </a:extLst>
+          </p:cNvPr>
+          <p:cNvPicPr>
+            <a:picLocks noChangeAspect="1"/>
+          </p:cNvPicPr>
+          <p:nvPr/>
+        </p:nvPicPr>
+        <p:blipFill>
+          <a:blip r:embed="rId4"/>
+          <a:stretch>
+            <a:fillRect/>
+          </a:stretch>
+        </p:blipFill>
+        <p:spPr>
+          <a:xfrm>
+            <a:off x="2640985" y="3863928"/>
+            <a:ext cx="161893" cy="147638"/>
+          </a:xfrm>
+          <a:prstGeom prst="rect">
+            <a:avLst/>
+          </a:prstGeom>
+        </p:spPr>
+      </p:pic>
+      <p:pic>
+        <p:nvPicPr>
+          <p:cNvPr id="33" name="Picture 32">
+            <a:extLst>
+              <a:ext uri="{FF2B5EF4-FFF2-40B4-BE49-F238E27FC236}">
+                <a16:creationId xmlns:a16="http://schemas.microsoft.com/office/drawing/2014/main" id="{761DC41A-8383-4203-814F-F78A2C1BCA5A}"/>
+              </a:ext>
+            </a:extLst>
+          </p:cNvPr>
+          <p:cNvPicPr>
+            <a:picLocks noChangeAspect="1"/>
+          </p:cNvPicPr>
+          <p:nvPr/>
+        </p:nvPicPr>
+        <p:blipFill>
+          <a:blip r:embed="rId5"/>
+          <a:stretch>
+            <a:fillRect/>
+          </a:stretch>
+        </p:blipFill>
+        <p:spPr>
+          <a:xfrm>
+            <a:off x="2246884" y="3867968"/>
+            <a:ext cx="149674" cy="147638"/>
+          </a:xfrm>
+          <a:prstGeom prst="rect">
+            <a:avLst/>
+          </a:prstGeom>
+        </p:spPr>
+      </p:pic>
+      <p:cxnSp>
+        <p:nvCxnSpPr>
+          <p:cNvPr id="34" name="Straight Connector 33">
+            <a:extLst>
+              <a:ext uri="{FF2B5EF4-FFF2-40B4-BE49-F238E27FC236}">
+                <a16:creationId xmlns:a16="http://schemas.microsoft.com/office/drawing/2014/main" id="{5F183EAF-DBA9-4232-BB7F-26FF01FC398C}"/>
+              </a:ext>
+            </a:extLst>
+          </p:cNvPr>
+          <p:cNvCxnSpPr>
+            <a:cxnSpLocks/>
+          </p:cNvCxnSpPr>
+          <p:nvPr/>
+        </p:nvCxnSpPr>
+        <p:spPr>
+          <a:xfrm flipV="1">
+            <a:off x="2453343" y="4236577"/>
+            <a:ext cx="2750632" cy="793002"/>
+          </a:xfrm>
+          <a:prstGeom prst="line">
+            <a:avLst/>
+          </a:prstGeom>
+          <a:ln>
+            <a:solidFill>
+              <a:srgbClr val="FF0000"/>
+            </a:solidFill>
+          </a:ln>
+        </p:spPr>
+        <p:style>
+          <a:lnRef idx="1">
+            <a:schemeClr val="accent2"/>
+          </a:lnRef>
+          <a:fillRef idx="0">
+            <a:schemeClr val="accent2"/>
+          </a:fillRef>
+          <a:effectRef idx="0">
+            <a:schemeClr val="accent2"/>
+          </a:effectRef>
+          <a:fontRef idx="minor">
+            <a:schemeClr val="tx1"/>
+          </a:fontRef>
+        </p:style>
+      </p:cxnSp>
+      <p:grpSp>
+        <p:nvGrpSpPr>
+          <p:cNvPr id="13" name="Group 12">
+            <a:extLst>
+              <a:ext uri="{FF2B5EF4-FFF2-40B4-BE49-F238E27FC236}">
+                <a16:creationId xmlns:a16="http://schemas.microsoft.com/office/drawing/2014/main" id="{25C0E863-6C17-43C3-9D56-1078A81AF6E2}"/>
+              </a:ext>
+            </a:extLst>
+          </p:cNvPr>
+          <p:cNvGrpSpPr/>
+          <p:nvPr/>
+        </p:nvGrpSpPr>
+        <p:grpSpPr>
+          <a:xfrm>
+            <a:off x="2250391" y="4936488"/>
+            <a:ext cx="391454" cy="253916"/>
+            <a:chOff x="4364021" y="4958521"/>
+            <a:chExt cx="391454" cy="253916"/>
+          </a:xfrm>
+        </p:grpSpPr>
+        <p:sp>
+          <p:nvSpPr>
+            <p:cNvPr id="9" name="Rectangle 8">
+              <a:extLst>
+                <a:ext uri="{FF2B5EF4-FFF2-40B4-BE49-F238E27FC236}">
+                  <a16:creationId xmlns:a16="http://schemas.microsoft.com/office/drawing/2014/main" id="{78606B28-4B12-41BE-94D0-CA5FEC8AC24B}"/>
+                </a:ext>
+              </a:extLst>
+            </p:cNvPr>
+            <p:cNvSpPr/>
+            <p:nvPr/>
+          </p:nvSpPr>
+          <p:spPr>
+            <a:xfrm>
+              <a:off x="4416252" y="4979686"/>
+              <a:ext cx="290512" cy="199479"/>
+            </a:xfrm>
+            <a:prstGeom prst="rect">
+              <a:avLst/>
+            </a:prstGeom>
+            <a:solidFill>
+              <a:srgbClr val="FFFFFF"/>
+            </a:solidFill>
+            <a:ln>
+              <a:solidFill>
+                <a:schemeClr val="tx1"/>
+              </a:solidFill>
+            </a:ln>
+          </p:spPr>
+          <p:style>
+            <a:lnRef idx="2">
+              <a:schemeClr val="accent1">
+                <a:shade val="50000"/>
+              </a:schemeClr>
+            </a:lnRef>
+            <a:fillRef idx="1">
+              <a:schemeClr val="accent1"/>
+            </a:fillRef>
+            <a:effectRef idx="0">
+              <a:schemeClr val="accent1"/>
+            </a:effectRef>
+            <a:fontRef idx="minor">
+              <a:schemeClr val="lt1"/>
+            </a:fontRef>
+          </p:style>
+          <p:txBody>
+            <a:bodyPr rtlCol="0" anchor="ctr"/>
+            <a:lstStyle/>
+            <a:p>
+              <a:pPr algn="ctr"/>
+              <a:endParaRPr lang="en-US"/>
+            </a:p>
+          </p:txBody>
+        </p:sp>
+        <p:sp>
+          <p:nvSpPr>
+            <p:cNvPr id="8" name="TextBox 7">
+              <a:extLst>
+                <a:ext uri="{FF2B5EF4-FFF2-40B4-BE49-F238E27FC236}">
+                  <a16:creationId xmlns:a16="http://schemas.microsoft.com/office/drawing/2014/main" id="{2310A27A-4716-4E70-B84E-AF621FEF912A}"/>
+                </a:ext>
+              </a:extLst>
+            </p:cNvPr>
+            <p:cNvSpPr txBox="1"/>
+            <p:nvPr/>
+          </p:nvSpPr>
+          <p:spPr>
+            <a:xfrm>
+              <a:off x="4364021" y="4958521"/>
+              <a:ext cx="391454" cy="253916"/>
+            </a:xfrm>
+            <a:prstGeom prst="rect">
+              <a:avLst/>
+            </a:prstGeom>
+            <a:noFill/>
+          </p:spPr>
+          <p:txBody>
+            <a:bodyPr wrap="none" rtlCol="0">
+              <a:spAutoFit/>
+            </a:bodyPr>
+            <a:lstStyle/>
+            <a:p>
+              <a:r>
+                <a:rPr lang="en-US" sz="1050"/>
+                <a:t>640</a:t>
+              </a:r>
+            </a:p>
+          </p:txBody>
+        </p:sp>
+      </p:grpSp>
+      <p:sp>
+        <p:nvSpPr>
+          <p:cNvPr id="35" name="TextBox 34">
+            <a:extLst>
+              <a:ext uri="{FF2B5EF4-FFF2-40B4-BE49-F238E27FC236}">
+                <a16:creationId xmlns:a16="http://schemas.microsoft.com/office/drawing/2014/main" id="{FBEAFCA6-EE72-4C75-BD0B-9FCF58141708}"/>
+              </a:ext>
+            </a:extLst>
+          </p:cNvPr>
+          <p:cNvSpPr txBox="1"/>
+          <p:nvPr/>
+        </p:nvSpPr>
+        <p:spPr>
+          <a:xfrm>
+            <a:off x="5368475" y="3775862"/>
+            <a:ext cx="3376245" cy="938719"/>
+          </a:xfrm>
+          <a:prstGeom prst="rect">
+            <a:avLst/>
+          </a:prstGeom>
+          <a:noFill/>
+        </p:spPr>
+        <p:txBody>
+          <a:bodyPr wrap="none" rtlCol="0">
+            <a:spAutoFit/>
+          </a:bodyPr>
+          <a:lstStyle/>
+          <a:p>
+            <a:r>
+              <a:rPr lang="en-US" sz="1100">
+                <a:latin typeface="Arial" panose="020B0604020202020204" pitchFamily="34" charset="0"/>
+                <a:cs typeface="Arial" panose="020B0604020202020204" pitchFamily="34" charset="0"/>
+              </a:rPr>
+              <a:t>Double click để hiển thị text box</a:t>
+            </a:r>
+            <a:br>
+              <a:rPr lang="en-US" sz="1100">
+                <a:latin typeface="Arial" panose="020B0604020202020204" pitchFamily="34" charset="0"/>
+                <a:cs typeface="Arial" panose="020B0604020202020204" pitchFamily="34" charset="0"/>
+              </a:rPr>
+            </a:br>
+            <a:r>
+              <a:rPr lang="en-US" sz="1100">
+                <a:latin typeface="Arial" panose="020B0604020202020204" pitchFamily="34" charset="0"/>
+                <a:cs typeface="Arial" panose="020B0604020202020204" pitchFamily="34" charset="0"/>
+              </a:rPr>
+              <a:t>Press Esc sẽ tắt text box và quay lại giá trị ban đầu</a:t>
+            </a:r>
+            <a:br>
+              <a:rPr lang="en-US" sz="1100">
+                <a:latin typeface="Arial" panose="020B0604020202020204" pitchFamily="34" charset="0"/>
+                <a:cs typeface="Arial" panose="020B0604020202020204" pitchFamily="34" charset="0"/>
+              </a:rPr>
+            </a:br>
+            <a:r>
+              <a:rPr lang="en-US" sz="1100">
+                <a:latin typeface="Arial" panose="020B0604020202020204" pitchFamily="34" charset="0"/>
+                <a:cs typeface="Arial" panose="020B0604020202020204" pitchFamily="34" charset="0"/>
+              </a:rPr>
+              <a:t>Lost focus sẽ tắt text box và hiển thị giá trị mới</a:t>
+            </a:r>
+          </a:p>
+          <a:p>
+            <a:r>
+              <a:rPr lang="en-US" sz="1100">
+                <a:latin typeface="Arial" panose="020B0604020202020204" pitchFamily="34" charset="0"/>
+                <a:cs typeface="Arial" panose="020B0604020202020204" pitchFamily="34" charset="0"/>
+              </a:rPr>
+              <a:t>Press Enter sẽ tắt text box và hiển thị giá trị mới</a:t>
+            </a:r>
+            <a:br>
+              <a:rPr lang="en-US" sz="1100">
+                <a:latin typeface="Arial" panose="020B0604020202020204" pitchFamily="34" charset="0"/>
+                <a:cs typeface="Arial" panose="020B0604020202020204" pitchFamily="34" charset="0"/>
+              </a:rPr>
+            </a:br>
+            <a:r>
+              <a:rPr lang="en-US" sz="1100">
+                <a:latin typeface="Arial" panose="020B0604020202020204" pitchFamily="34" charset="0"/>
+                <a:cs typeface="Arial" panose="020B0604020202020204" pitchFamily="34" charset="0"/>
+              </a:rPr>
+              <a:t>Text box nhận giá trị từ 0 đến 65535 (ushort.Max)</a:t>
+            </a:r>
+          </a:p>
+        </p:txBody>
+      </p:sp>
+    </p:spTree>
+    <p:extLst>
+      <p:ext uri="{BB962C8B-B14F-4D97-AF65-F5344CB8AC3E}">
+        <p14:creationId xmlns:p14="http://schemas.microsoft.com/office/powerpoint/2010/main" val="3633184273"/>
       </p:ext>
     </p:extLst>
   </p:cSld>

</xml_diff>